<commit_message>
Màj de la présentation.
</commit_message>
<xml_diff>
--- a/Documentation/Présentation/Projet de semestre.pptx
+++ b/Documentation/Présentation/Projet de semestre.pptx
@@ -5,10 +5,10 @@
     <p:sldMasterId id="2147483648" r:id="rId1"/>
   </p:sldMasterIdLst>
   <p:notesMasterIdLst>
-    <p:notesMasterId r:id="rId12"/>
+    <p:notesMasterId r:id="rId13"/>
   </p:notesMasterIdLst>
   <p:handoutMasterIdLst>
-    <p:handoutMasterId r:id="rId13"/>
+    <p:handoutMasterId r:id="rId14"/>
   </p:handoutMasterIdLst>
   <p:sldIdLst>
     <p:sldId id="256" r:id="rId2"/>
@@ -20,7 +20,8 @@
     <p:sldId id="266" r:id="rId8"/>
     <p:sldId id="269" r:id="rId9"/>
     <p:sldId id="263" r:id="rId10"/>
-    <p:sldId id="265" r:id="rId11"/>
+    <p:sldId id="270" r:id="rId11"/>
+    <p:sldId id="265" r:id="rId12"/>
   </p:sldIdLst>
   <p:sldSz cx="10080625" cy="6300788"/>
   <p:notesSz cx="7559675" cy="10691813"/>
@@ -1824,6 +1825,78 @@
 </file>
 
 <file path=ppt/notesSlides/notesSlide8.xml><?xml version="1.0" encoding="utf-8"?>
+<p:notes xmlns:a="http://schemas.openxmlformats.org/drawingml/2006/main" xmlns:r="http://schemas.openxmlformats.org/officeDocument/2006/relationships" xmlns:p="http://schemas.openxmlformats.org/presentationml/2006/main">
+  <p:cSld>
+    <p:spTree>
+      <p:nvGrpSpPr>
+        <p:cNvPr id="1" name=""/>
+        <p:cNvGrpSpPr/>
+        <p:nvPr/>
+      </p:nvGrpSpPr>
+      <p:grpSpPr>
+        <a:xfrm>
+          <a:off x="0" y="0"/>
+          <a:ext cx="0" cy="0"/>
+          <a:chOff x="0" y="0"/>
+          <a:chExt cx="0" cy="0"/>
+        </a:xfrm>
+      </p:grpSpPr>
+      <p:sp>
+        <p:nvSpPr>
+          <p:cNvPr id="2" name="Espace réservé de l'image des diapositives 1"/>
+          <p:cNvSpPr>
+            <a:spLocks noGrp="1" noRot="1" noChangeAspect="1"/>
+          </p:cNvSpPr>
+          <p:nvPr>
+            <p:ph type="sldImg"/>
+          </p:nvPr>
+        </p:nvSpPr>
+        <p:spPr>
+          <a:xfrm>
+            <a:off x="574675" y="812800"/>
+            <a:ext cx="6405563" cy="4005263"/>
+          </a:xfrm>
+          <a:solidFill>
+            <a:srgbClr val="729FCF"/>
+          </a:solidFill>
+          <a:ln w="25402">
+            <a:solidFill>
+              <a:srgbClr val="3465AF"/>
+            </a:solidFill>
+            <a:prstDash val="solid"/>
+          </a:ln>
+        </p:spPr>
+      </p:sp>
+      <p:sp>
+        <p:nvSpPr>
+          <p:cNvPr id="3" name="Espace réservé des commentaires 2"/>
+          <p:cNvSpPr txBox="1">
+            <a:spLocks noGrp="1"/>
+          </p:cNvSpPr>
+          <p:nvPr>
+            <p:ph type="body" sz="quarter" idx="1"/>
+          </p:nvPr>
+        </p:nvSpPr>
+        <p:spPr/>
+        <p:txBody>
+          <a:bodyPr>
+            <a:spAutoFit/>
+          </a:bodyPr>
+          <a:lstStyle/>
+          <a:p>
+            <a:endParaRPr lang="fr-CH" dirty="0"/>
+          </a:p>
+        </p:txBody>
+      </p:sp>
+    </p:spTree>
+  </p:cSld>
+  <p:clrMapOvr>
+    <a:masterClrMapping/>
+  </p:clrMapOvr>
+</p:notes>
+</file>
+
+<file path=ppt/notesSlides/notesSlide9.xml><?xml version="1.0" encoding="utf-8"?>
 <p:notes xmlns:a="http://schemas.openxmlformats.org/drawingml/2006/main" xmlns:r="http://schemas.openxmlformats.org/officeDocument/2006/relationships" xmlns:p="http://schemas.openxmlformats.org/presentationml/2006/main">
   <p:cSld>
     <p:spTree>
@@ -5417,37 +5490,6 @@
           </a:p>
         </p:txBody>
       </p:sp>
-      <p:sp>
-        <p:nvSpPr>
-          <p:cNvPr id="6" name="ZoneTexte 5"/>
-          <p:cNvSpPr txBox="1"/>
-          <p:nvPr/>
-        </p:nvSpPr>
-        <p:spPr>
-          <a:xfrm>
-            <a:off x="8136656" y="5886698"/>
-            <a:ext cx="1944216" cy="369332"/>
-          </a:xfrm>
-          <a:prstGeom prst="rect">
-            <a:avLst/>
-          </a:prstGeom>
-          <a:noFill/>
-        </p:spPr>
-        <p:txBody>
-          <a:bodyPr wrap="square" rtlCol="0">
-            <a:spAutoFit/>
-          </a:bodyPr>
-          <a:lstStyle/>
-          <a:p>
-            <a:pPr algn="r"/>
-            <a:r>
-              <a:rPr lang="fr-CH" dirty="0" smtClean="0"/>
-              <a:t>Présentation orale</a:t>
-            </a:r>
-            <a:endParaRPr lang="fr-CH" dirty="0"/>
-          </a:p>
-        </p:txBody>
-      </p:sp>
       <p:pic>
         <p:nvPicPr>
           <p:cNvPr id="3" name="Image 2"/>
@@ -5480,6 +5522,47 @@
           </a:ln>
         </p:spPr>
       </p:pic>
+      <p:pic>
+        <p:nvPicPr>
+          <p:cNvPr id="1027" name="Picture 3" descr="C:\Users\Miguel\Copy\Cours\2ème_année\PRO\ProjetChat2015\Documentation\Présentation\heig.png"/>
+          <p:cNvPicPr>
+            <a:picLocks noChangeAspect="1" noChangeArrowheads="1"/>
+          </p:cNvPicPr>
+          <p:nvPr/>
+        </p:nvPicPr>
+        <p:blipFill>
+          <a:blip r:embed="rId4" cstate="print">
+            <a:extLst>
+              <a:ext uri="{28A0092B-C50C-407E-A947-70E740481C1C}">
+                <a14:useLocalDpi xmlns:a14="http://schemas.microsoft.com/office/drawing/2010/main" val="0"/>
+              </a:ext>
+            </a:extLst>
+          </a:blip>
+          <a:srcRect/>
+          <a:stretch>
+            <a:fillRect/>
+          </a:stretch>
+        </p:blipFill>
+        <p:spPr bwMode="auto">
+          <a:xfrm>
+            <a:off x="9114686" y="5958706"/>
+            <a:ext cx="894259" cy="305455"/>
+          </a:xfrm>
+          <a:prstGeom prst="rect">
+            <a:avLst/>
+          </a:prstGeom>
+          <a:noFill/>
+          <a:extLst>
+            <a:ext uri="{909E8E84-426E-40DD-AFC4-6F175D3DCCD1}">
+              <a14:hiddenFill xmlns:a14="http://schemas.microsoft.com/office/drawing/2010/main">
+                <a:solidFill>
+                  <a:srgbClr val="FFFFFF"/>
+                </a:solidFill>
+              </a14:hiddenFill>
+            </a:ext>
+          </a:extLst>
+        </p:spPr>
+      </p:pic>
     </p:spTree>
   </p:cSld>
   <p:clrMapOvr>
@@ -5499,6 +5582,455 @@
 </file>
 
 <file path=ppt/slides/slide10.xml><?xml version="1.0" encoding="utf-8"?>
+<p:sld xmlns:a="http://schemas.openxmlformats.org/drawingml/2006/main" xmlns:r="http://schemas.openxmlformats.org/officeDocument/2006/relationships" xmlns:p="http://schemas.openxmlformats.org/presentationml/2006/main">
+  <p:cSld>
+    <p:spTree>
+      <p:nvGrpSpPr>
+        <p:cNvPr id="1" name=""/>
+        <p:cNvGrpSpPr/>
+        <p:nvPr/>
+      </p:nvGrpSpPr>
+      <p:grpSpPr>
+        <a:xfrm>
+          <a:off x="0" y="0"/>
+          <a:ext cx="0" cy="0"/>
+          <a:chOff x="0" y="0"/>
+          <a:chExt cx="0" cy="0"/>
+        </a:xfrm>
+      </p:grpSpPr>
+      <p:sp>
+        <p:nvSpPr>
+          <p:cNvPr id="2" name="Titre 1"/>
+          <p:cNvSpPr txBox="1">
+            <a:spLocks noGrp="1"/>
+          </p:cNvSpPr>
+          <p:nvPr>
+            <p:ph type="title" idx="4294967295"/>
+          </p:nvPr>
+        </p:nvSpPr>
+        <p:spPr/>
+        <p:txBody>
+          <a:bodyPr/>
+          <a:lstStyle/>
+          <a:p>
+            <a:pPr lvl="0"/>
+            <a:r>
+              <a:rPr lang="fr-CH" sz="4000" dirty="0" smtClean="0"/>
+              <a:t>Bilan / Conclusion</a:t>
+            </a:r>
+            <a:endParaRPr lang="fr-CH" sz="4000" dirty="0"/>
+          </a:p>
+        </p:txBody>
+      </p:sp>
+      <p:sp>
+        <p:nvSpPr>
+          <p:cNvPr id="3" name="Espace réservé du texte 2"/>
+          <p:cNvSpPr txBox="1">
+            <a:spLocks noGrp="1"/>
+          </p:cNvSpPr>
+          <p:nvPr>
+            <p:ph type="body" idx="4294967295"/>
+          </p:nvPr>
+        </p:nvSpPr>
+        <p:spPr>
+          <a:xfrm>
+            <a:off x="6264448" y="2358306"/>
+            <a:ext cx="3672161" cy="2376264"/>
+          </a:xfrm>
+        </p:spPr>
+        <p:txBody>
+          <a:bodyPr/>
+          <a:lstStyle/>
+          <a:p>
+            <a:pPr lvl="0">
+              <a:buClr>
+                <a:srgbClr val="000000"/>
+              </a:buClr>
+              <a:buSzPct val="45000"/>
+            </a:pPr>
+            <a:r>
+              <a:rPr lang="fr-FR" sz="1800" dirty="0" smtClean="0"/>
+              <a:t>Quelques </a:t>
+            </a:r>
+            <a:r>
+              <a:rPr lang="fr-FR" sz="1800" dirty="0" smtClean="0"/>
+              <a:t>chiffres…</a:t>
+            </a:r>
+          </a:p>
+          <a:p>
+            <a:pPr marL="685617" lvl="0" indent="-342900">
+              <a:lnSpc>
+                <a:spcPct val="50000"/>
+              </a:lnSpc>
+              <a:buClr>
+                <a:srgbClr val="000000"/>
+              </a:buClr>
+              <a:buSzPct val="80000"/>
+              <a:buBlip>
+                <a:blip r:embed="rId3"/>
+              </a:buBlip>
+            </a:pPr>
+            <a:r>
+              <a:rPr lang="fr-FR" sz="1800" dirty="0" smtClean="0"/>
+              <a:t> 14 semaines </a:t>
+            </a:r>
+            <a:r>
+              <a:rPr lang="fr-FR" sz="1800" dirty="0" smtClean="0"/>
+              <a:t>de travail.</a:t>
+            </a:r>
+            <a:endParaRPr lang="fr-FR" sz="1800" dirty="0"/>
+          </a:p>
+          <a:p>
+            <a:pPr marL="685617" lvl="0" indent="-342900">
+              <a:lnSpc>
+                <a:spcPct val="50000"/>
+              </a:lnSpc>
+              <a:buClr>
+                <a:srgbClr val="000000"/>
+              </a:buClr>
+              <a:buSzPct val="80000"/>
+              <a:buBlip>
+                <a:blip r:embed="rId3"/>
+              </a:buBlip>
+            </a:pPr>
+            <a:r>
+              <a:rPr lang="fr-FR" sz="1800" dirty="0"/>
+              <a:t> 110 pages de documentation</a:t>
+            </a:r>
+            <a:r>
+              <a:rPr lang="fr-FR" sz="1800" dirty="0" smtClean="0"/>
+              <a:t>.</a:t>
+            </a:r>
+            <a:endParaRPr lang="fr-FR" sz="1800" dirty="0" smtClean="0"/>
+          </a:p>
+          <a:p>
+            <a:pPr marL="685617" lvl="0" indent="-342900">
+              <a:lnSpc>
+                <a:spcPct val="50000"/>
+              </a:lnSpc>
+              <a:buClr>
+                <a:srgbClr val="000000"/>
+              </a:buClr>
+              <a:buSzPct val="80000"/>
+              <a:buBlip>
+                <a:blip r:embed="rId3"/>
+              </a:buBlip>
+            </a:pPr>
+            <a:r>
+              <a:rPr lang="fr-FR" sz="1800" dirty="0" smtClean="0"/>
+              <a:t> 501 heures totales de travail.</a:t>
+            </a:r>
+          </a:p>
+          <a:p>
+            <a:pPr marL="685617" lvl="0" indent="-342900">
+              <a:lnSpc>
+                <a:spcPct val="50000"/>
+              </a:lnSpc>
+              <a:buClr>
+                <a:srgbClr val="000000"/>
+              </a:buClr>
+              <a:buSzPct val="80000"/>
+              <a:buBlip>
+                <a:blip r:embed="rId3"/>
+              </a:buBlip>
+            </a:pPr>
+            <a:r>
+              <a:rPr lang="fr-FR" sz="1800" dirty="0" smtClean="0"/>
+              <a:t> 3’662 fichiers échangés.</a:t>
+            </a:r>
+          </a:p>
+          <a:p>
+            <a:pPr marL="685617" lvl="0" indent="-342900">
+              <a:lnSpc>
+                <a:spcPct val="50000"/>
+              </a:lnSpc>
+              <a:buClr>
+                <a:srgbClr val="000000"/>
+              </a:buClr>
+              <a:buSzPct val="80000"/>
+              <a:buBlip>
+                <a:blip r:embed="rId3"/>
+              </a:buBlip>
+            </a:pPr>
+            <a:r>
+              <a:rPr lang="fr-FR" sz="1800" dirty="0" smtClean="0"/>
+              <a:t> </a:t>
+            </a:r>
+            <a:r>
+              <a:rPr lang="fr-FR" sz="1800" dirty="0" smtClean="0"/>
+              <a:t>9’242 </a:t>
+            </a:r>
+            <a:r>
+              <a:rPr lang="fr-FR" sz="1800" dirty="0" smtClean="0"/>
+              <a:t>lignes de code</a:t>
+            </a:r>
+            <a:r>
+              <a:rPr lang="fr-FR" sz="1800" dirty="0" smtClean="0"/>
+              <a:t>.</a:t>
+            </a:r>
+          </a:p>
+          <a:p>
+            <a:pPr marL="685617" lvl="0" indent="-342900">
+              <a:lnSpc>
+                <a:spcPct val="50000"/>
+              </a:lnSpc>
+              <a:buClr>
+                <a:srgbClr val="000000"/>
+              </a:buClr>
+              <a:buSzPct val="80000"/>
+              <a:buBlip>
+                <a:blip r:embed="rId3"/>
+              </a:buBlip>
+            </a:pPr>
+            <a:r>
+              <a:rPr lang="fr-FR" sz="1800" dirty="0" smtClean="0"/>
+              <a:t> 9’927 messages échangés.</a:t>
+            </a:r>
+          </a:p>
+          <a:p>
+            <a:pPr marL="685617" lvl="0" indent="-342900">
+              <a:lnSpc>
+                <a:spcPct val="50000"/>
+              </a:lnSpc>
+              <a:buClr>
+                <a:srgbClr val="000000"/>
+              </a:buClr>
+              <a:buSzPct val="80000"/>
+              <a:buBlip>
+                <a:blip r:embed="rId3"/>
+              </a:buBlip>
+            </a:pPr>
+            <a:r>
+              <a:rPr lang="fr-FR" sz="1800" dirty="0"/>
+              <a:t> </a:t>
+            </a:r>
+            <a:r>
+              <a:rPr lang="fr-FR" sz="1800" strike="sngStrike" dirty="0" smtClean="0"/>
+              <a:t>15</a:t>
+            </a:r>
+            <a:r>
+              <a:rPr lang="fr-FR" sz="1800" dirty="0" smtClean="0"/>
+              <a:t> </a:t>
+            </a:r>
+            <a:r>
+              <a:rPr lang="fr-FR" sz="1800" dirty="0" smtClean="0"/>
+              <a:t>2 apéros.</a:t>
+            </a:r>
+          </a:p>
+        </p:txBody>
+      </p:sp>
+      <p:pic>
+        <p:nvPicPr>
+          <p:cNvPr id="4" name="Image 3"/>
+          <p:cNvPicPr>
+            <a:picLocks noChangeAspect="1"/>
+          </p:cNvPicPr>
+          <p:nvPr/>
+        </p:nvPicPr>
+        <p:blipFill>
+          <a:blip r:embed="rId4">
+            <a:lum/>
+            <a:alphaModFix/>
+          </a:blip>
+          <a:srcRect/>
+          <a:stretch>
+            <a:fillRect/>
+          </a:stretch>
+        </p:blipFill>
+        <p:spPr>
+          <a:xfrm>
+            <a:off x="287999" y="195837"/>
+            <a:ext cx="1151997" cy="1082878"/>
+          </a:xfrm>
+          <a:prstGeom prst="rect">
+            <a:avLst/>
+          </a:prstGeom>
+          <a:noFill/>
+          <a:ln>
+            <a:noFill/>
+          </a:ln>
+        </p:spPr>
+      </p:pic>
+      <p:pic>
+        <p:nvPicPr>
+          <p:cNvPr id="5" name="Image 8"/>
+          <p:cNvPicPr>
+            <a:picLocks noChangeAspect="1"/>
+          </p:cNvPicPr>
+          <p:nvPr/>
+        </p:nvPicPr>
+        <p:blipFill>
+          <a:blip r:embed="rId4">
+            <a:lum/>
+            <a:alphaModFix/>
+          </a:blip>
+          <a:srcRect/>
+          <a:stretch>
+            <a:fillRect/>
+          </a:stretch>
+        </p:blipFill>
+        <p:spPr>
+          <a:xfrm flipH="1">
+            <a:off x="8640842" y="195837"/>
+            <a:ext cx="1151997" cy="1082494"/>
+          </a:xfrm>
+          <a:prstGeom prst="rect">
+            <a:avLst/>
+          </a:prstGeom>
+          <a:noFill/>
+          <a:ln>
+            <a:noFill/>
+          </a:ln>
+        </p:spPr>
+      </p:pic>
+      <p:sp>
+        <p:nvSpPr>
+          <p:cNvPr id="7" name="ZoneTexte 8"/>
+          <p:cNvSpPr txBox="1"/>
+          <p:nvPr/>
+        </p:nvSpPr>
+        <p:spPr>
+          <a:xfrm>
+            <a:off x="9720830" y="5877406"/>
+            <a:ext cx="288036" cy="369332"/>
+          </a:xfrm>
+          <a:prstGeom prst="rect">
+            <a:avLst/>
+          </a:prstGeom>
+          <a:noFill/>
+          <a:ln>
+            <a:noFill/>
+          </a:ln>
+        </p:spPr>
+        <p:txBody>
+          <a:bodyPr vert="horz" wrap="square" lIns="91440" tIns="45720" rIns="91440" bIns="45720" anchor="t" anchorCtr="0" compatLnSpc="1">
+            <a:spAutoFit/>
+          </a:bodyPr>
+          <a:lstStyle/>
+          <a:p>
+            <a:pPr marL="0" marR="0" lvl="0" indent="0" algn="l" defTabSz="914400" rtl="0" fontAlgn="auto" hangingPunct="1">
+              <a:lnSpc>
+                <a:spcPct val="100000"/>
+              </a:lnSpc>
+              <a:spcBef>
+                <a:spcPts val="0"/>
+              </a:spcBef>
+              <a:spcAft>
+                <a:spcPts val="0"/>
+              </a:spcAft>
+              <a:buNone/>
+              <a:tabLst/>
+              <a:defRPr sz="1800" b="0" i="0" u="none" strike="noStrike" kern="0" cap="none" spc="0" baseline="0">
+                <a:solidFill>
+                  <a:srgbClr val="000000"/>
+                </a:solidFill>
+                <a:uFillTx/>
+              </a:defRPr>
+            </a:pPr>
+            <a:r>
+              <a:rPr lang="fr-CH" sz="1800" b="0" i="0" u="none" strike="noStrike" kern="1200" cap="none" spc="0" baseline="0" dirty="0" smtClean="0">
+                <a:solidFill>
+                  <a:srgbClr val="000000"/>
+                </a:solidFill>
+                <a:uFillTx/>
+                <a:latin typeface="Calibri"/>
+              </a:rPr>
+              <a:t>8</a:t>
+            </a:r>
+            <a:endParaRPr lang="fr-CH" sz="1800" b="0" i="0" u="none" strike="noStrike" kern="1200" cap="none" spc="0" baseline="0" dirty="0">
+              <a:solidFill>
+                <a:srgbClr val="000000"/>
+              </a:solidFill>
+              <a:uFillTx/>
+              <a:latin typeface="Calibri"/>
+            </a:endParaRPr>
+          </a:p>
+        </p:txBody>
+      </p:sp>
+      <p:pic>
+        <p:nvPicPr>
+          <p:cNvPr id="1026" name="Picture 2"/>
+          <p:cNvPicPr>
+            <a:picLocks noChangeAspect="1" noChangeArrowheads="1"/>
+          </p:cNvPicPr>
+          <p:nvPr/>
+        </p:nvPicPr>
+        <p:blipFill>
+          <a:blip r:embed="rId5" cstate="print">
+            <a:extLst>
+              <a:ext uri="{28A0092B-C50C-407E-A947-70E740481C1C}">
+                <a14:useLocalDpi xmlns:a14="http://schemas.microsoft.com/office/drawing/2010/main" val="0"/>
+              </a:ext>
+            </a:extLst>
+          </a:blip>
+          <a:srcRect/>
+          <a:stretch>
+            <a:fillRect/>
+          </a:stretch>
+        </p:blipFill>
+        <p:spPr bwMode="auto">
+          <a:xfrm>
+            <a:off x="647824" y="1926258"/>
+            <a:ext cx="5396715" cy="3240360"/>
+          </a:xfrm>
+          <a:prstGeom prst="rect">
+            <a:avLst/>
+          </a:prstGeom>
+          <a:ln>
+            <a:noFill/>
+          </a:ln>
+          <a:effectLst>
+            <a:outerShdw blurRad="190500" algn="tl" rotWithShape="0">
+              <a:srgbClr val="000000">
+                <a:alpha val="70000"/>
+              </a:srgbClr>
+            </a:outerShdw>
+          </a:effectLst>
+          <a:extLst>
+            <a:ext uri="{909E8E84-426E-40DD-AFC4-6F175D3DCCD1}">
+              <a14:hiddenFill xmlns:a14="http://schemas.microsoft.com/office/drawing/2010/main">
+                <a:solidFill>
+                  <a:schemeClr val="accent1"/>
+                </a:solidFill>
+              </a14:hiddenFill>
+            </a:ext>
+            <a:ext uri="{91240B29-F687-4F45-9708-019B960494DF}">
+              <a14:hiddenLine xmlns:a14="http://schemas.microsoft.com/office/drawing/2010/main" w="9525">
+                <a:solidFill>
+                  <a:schemeClr val="tx1"/>
+                </a:solidFill>
+                <a:miter lim="800000"/>
+                <a:headEnd/>
+                <a:tailEnd/>
+              </a14:hiddenLine>
+            </a:ext>
+          </a:extLst>
+        </p:spPr>
+      </p:pic>
+    </p:spTree>
+    <p:extLst>
+      <p:ext uri="{BB962C8B-B14F-4D97-AF65-F5344CB8AC3E}">
+        <p14:creationId xmlns:p14="http://schemas.microsoft.com/office/powerpoint/2010/main" val="1453999075"/>
+      </p:ext>
+    </p:extLst>
+  </p:cSld>
+  <p:clrMapOvr>
+    <a:masterClrMapping/>
+  </p:clrMapOvr>
+  <p:transition spd="med">
+    <p:fade/>
+  </p:transition>
+  <p:timing>
+    <p:tnLst>
+      <p:par>
+        <p:cTn id="1" dur="indefinite" restart="never" nodeType="tmRoot"/>
+      </p:par>
+    </p:tnLst>
+  </p:timing>
+</p:sld>
+</file>
+
+<file path=ppt/slides/slide11.xml><?xml version="1.0" encoding="utf-8"?>
 <p:sld xmlns:a="http://schemas.openxmlformats.org/drawingml/2006/main" xmlns:r="http://schemas.openxmlformats.org/officeDocument/2006/relationships" xmlns:p="http://schemas.openxmlformats.org/presentationml/2006/main">
   <p:cSld name="page10">
     <p:spTree>
@@ -5624,37 +6156,6 @@
                 <a:schemeClr val="bg1"/>
               </a:solidFill>
             </a:endParaRPr>
-          </a:p>
-        </p:txBody>
-      </p:sp>
-      <p:sp>
-        <p:nvSpPr>
-          <p:cNvPr id="5" name="ZoneTexte 4"/>
-          <p:cNvSpPr txBox="1"/>
-          <p:nvPr/>
-        </p:nvSpPr>
-        <p:spPr>
-          <a:xfrm>
-            <a:off x="71760" y="5742682"/>
-            <a:ext cx="9937104" cy="369332"/>
-          </a:xfrm>
-          <a:prstGeom prst="rect">
-            <a:avLst/>
-          </a:prstGeom>
-          <a:noFill/>
-        </p:spPr>
-        <p:txBody>
-          <a:bodyPr wrap="square" rtlCol="0">
-            <a:spAutoFit/>
-          </a:bodyPr>
-          <a:lstStyle/>
-          <a:p>
-            <a:pPr algn="ctr"/>
-            <a:r>
-              <a:rPr lang="fr-CH" dirty="0" smtClean="0"/>
-              <a:t>Place à la démo !</a:t>
-            </a:r>
-            <a:endParaRPr lang="fr-CH" dirty="0"/>
           </a:p>
         </p:txBody>
       </p:sp>
@@ -5790,97 +6291,6 @@
                       </p:childTnLst>
                     </p:cTn>
                   </p:par>
-                  <p:par>
-                    <p:cTn id="12" fill="hold">
-                      <p:stCondLst>
-                        <p:cond delay="indefinite"/>
-                      </p:stCondLst>
-                      <p:childTnLst>
-                        <p:par>
-                          <p:cTn id="13" fill="hold">
-                            <p:stCondLst>
-                              <p:cond delay="0"/>
-                            </p:stCondLst>
-                            <p:childTnLst>
-                              <p:par>
-                                <p:cTn id="14" presetID="2" presetClass="entr" presetSubtype="4" fill="hold" grpId="0" nodeType="clickEffect">
-                                  <p:stCondLst>
-                                    <p:cond delay="0"/>
-                                  </p:stCondLst>
-                                  <p:childTnLst>
-                                    <p:set>
-                                      <p:cBhvr>
-                                        <p:cTn id="15" dur="1" fill="hold">
-                                          <p:stCondLst>
-                                            <p:cond delay="0"/>
-                                          </p:stCondLst>
-                                        </p:cTn>
-                                        <p:tgtEl>
-                                          <p:spTgt spid="5"/>
-                                        </p:tgtEl>
-                                        <p:attrNameLst>
-                                          <p:attrName>style.visibility</p:attrName>
-                                        </p:attrNameLst>
-                                      </p:cBhvr>
-                                      <p:to>
-                                        <p:strVal val="visible"/>
-                                      </p:to>
-                                    </p:set>
-                                    <p:anim calcmode="lin" valueType="num">
-                                      <p:cBhvr additive="base">
-                                        <p:cTn id="16" dur="500" fill="hold"/>
-                                        <p:tgtEl>
-                                          <p:spTgt spid="5"/>
-                                        </p:tgtEl>
-                                        <p:attrNameLst>
-                                          <p:attrName>ppt_x</p:attrName>
-                                        </p:attrNameLst>
-                                      </p:cBhvr>
-                                      <p:tavLst>
-                                        <p:tav tm="0">
-                                          <p:val>
-                                            <p:strVal val="#ppt_x"/>
-                                          </p:val>
-                                        </p:tav>
-                                        <p:tav tm="100000">
-                                          <p:val>
-                                            <p:strVal val="#ppt_x"/>
-                                          </p:val>
-                                        </p:tav>
-                                      </p:tavLst>
-                                    </p:anim>
-                                    <p:anim calcmode="lin" valueType="num">
-                                      <p:cBhvr additive="base">
-                                        <p:cTn id="17" dur="500" fill="hold"/>
-                                        <p:tgtEl>
-                                          <p:spTgt spid="5"/>
-                                        </p:tgtEl>
-                                        <p:attrNameLst>
-                                          <p:attrName>ppt_y</p:attrName>
-                                        </p:attrNameLst>
-                                      </p:cBhvr>
-                                      <p:tavLst>
-                                        <p:tav tm="0">
-                                          <p:val>
-                                            <p:strVal val="1+#ppt_h/2"/>
-                                          </p:val>
-                                        </p:tav>
-                                        <p:tav tm="100000">
-                                          <p:val>
-                                            <p:strVal val="#ppt_y"/>
-                                          </p:val>
-                                        </p:tav>
-                                      </p:tavLst>
-                                    </p:anim>
-                                  </p:childTnLst>
-                                </p:cTn>
-                              </p:par>
-                            </p:childTnLst>
-                          </p:cTn>
-                        </p:par>
-                      </p:childTnLst>
-                    </p:cTn>
-                  </p:par>
                 </p:childTnLst>
               </p:cTn>
               <p:prevCondLst>
@@ -5902,9 +6312,6 @@
         </p:cTn>
       </p:par>
     </p:tnLst>
-    <p:bldLst>
-      <p:bldP spid="5" grpId="0"/>
-    </p:bldLst>
   </p:timing>
 </p:sld>
 </file>
@@ -5971,28 +6378,34 @@
           <a:bodyPr/>
           <a:lstStyle/>
           <a:p>
-            <a:pPr lvl="0">
+            <a:pPr marL="799917" lvl="0" indent="-457200">
               <a:buClr>
                 <a:srgbClr val="000000"/>
               </a:buClr>
-              <a:buSzPct val="45000"/>
-              <a:buFont typeface="StarSymbol"/>
-              <a:buChar char="●"/>
+              <a:buSzPct val="80000"/>
+              <a:buBlip>
+                <a:blip r:embed="rId3"/>
+              </a:buBlip>
             </a:pPr>
             <a:r>
               <a:rPr lang="fr-FR" dirty="0" smtClean="0"/>
-              <a:t> Description de l’application</a:t>
+              <a:t> Description de </a:t>
+            </a:r>
+            <a:r>
+              <a:rPr lang="fr-FR" dirty="0" smtClean="0"/>
+              <a:t>l’application / Démo</a:t>
             </a:r>
             <a:endParaRPr lang="fr-FR" dirty="0"/>
           </a:p>
           <a:p>
-            <a:pPr lvl="0">
+            <a:pPr marL="799917" lvl="0" indent="-457200">
               <a:buClr>
                 <a:srgbClr val="000000"/>
               </a:buClr>
-              <a:buSzPct val="45000"/>
-              <a:buFont typeface="StarSymbol"/>
-              <a:buChar char="●"/>
+              <a:buSzPct val="80000"/>
+              <a:buBlip>
+                <a:blip r:embed="rId3"/>
+              </a:buBlip>
             </a:pPr>
             <a:r>
               <a:rPr lang="fr-FR" dirty="0"/>
@@ -6005,13 +6418,14 @@
             <a:endParaRPr lang="fr-FR" dirty="0"/>
           </a:p>
           <a:p>
-            <a:pPr lvl="0">
+            <a:pPr marL="799917" lvl="0" indent="-457200">
               <a:buClr>
                 <a:srgbClr val="000000"/>
               </a:buClr>
-              <a:buSzPct val="45000"/>
-              <a:buFont typeface="StarSymbol"/>
-              <a:buChar char="●"/>
+              <a:buSzPct val="80000"/>
+              <a:buBlip>
+                <a:blip r:embed="rId3"/>
+              </a:buBlip>
             </a:pPr>
             <a:r>
               <a:rPr lang="fr-FR" dirty="0"/>
@@ -6024,13 +6438,14 @@
             <a:endParaRPr lang="fr-FR" dirty="0"/>
           </a:p>
           <a:p>
-            <a:pPr lvl="0">
+            <a:pPr marL="799917" lvl="0" indent="-457200">
               <a:buClr>
                 <a:srgbClr val="000000"/>
               </a:buClr>
-              <a:buSzPct val="45000"/>
-              <a:buFont typeface="StarSymbol"/>
-              <a:buChar char="●"/>
+              <a:buSzPct val="80000"/>
+              <a:buBlip>
+                <a:blip r:embed="rId3"/>
+              </a:buBlip>
             </a:pPr>
             <a:r>
               <a:rPr lang="fr-FR" dirty="0"/>
@@ -6043,13 +6458,14 @@
             <a:endParaRPr lang="fr-FR" dirty="0"/>
           </a:p>
           <a:p>
-            <a:pPr lvl="0">
+            <a:pPr marL="799917" lvl="0" indent="-457200">
               <a:buClr>
                 <a:srgbClr val="000000"/>
               </a:buClr>
-              <a:buSzPct val="45000"/>
-              <a:buFont typeface="StarSymbol"/>
-              <a:buChar char="●"/>
+              <a:buSzPct val="80000"/>
+              <a:buBlip>
+                <a:blip r:embed="rId3"/>
+              </a:buBlip>
             </a:pPr>
             <a:r>
               <a:rPr lang="fr-FR" dirty="0"/>
@@ -6062,13 +6478,14 @@
             <a:endParaRPr lang="fr-FR" dirty="0"/>
           </a:p>
           <a:p>
-            <a:pPr lvl="0">
+            <a:pPr marL="799917" lvl="0" indent="-457200">
               <a:buClr>
                 <a:srgbClr val="000000"/>
               </a:buClr>
-              <a:buSzPct val="45000"/>
-              <a:buFont typeface="StarSymbol"/>
-              <a:buChar char="●"/>
+              <a:buSzPct val="80000"/>
+              <a:buBlip>
+                <a:blip r:embed="rId3"/>
+              </a:buBlip>
             </a:pPr>
             <a:r>
               <a:rPr lang="fr-FR" dirty="0"/>
@@ -6091,7 +6508,7 @@
           <p:nvPr/>
         </p:nvPicPr>
         <p:blipFill>
-          <a:blip r:embed="rId3">
+          <a:blip r:embed="rId4">
             <a:lum/>
             <a:alphaModFix/>
           </a:blip>
@@ -6123,7 +6540,7 @@
           <p:nvPr/>
         </p:nvPicPr>
         <p:blipFill>
-          <a:blip r:embed="rId4"/>
+          <a:blip r:embed="rId5"/>
           <a:srcRect/>
           <a:stretch>
             <a:fillRect/>
@@ -6467,6 +6884,37 @@
           </a:p>
         </p:txBody>
       </p:sp>
+      <p:sp>
+        <p:nvSpPr>
+          <p:cNvPr id="7" name="ZoneTexte 6"/>
+          <p:cNvSpPr txBox="1"/>
+          <p:nvPr/>
+        </p:nvSpPr>
+        <p:spPr>
+          <a:xfrm>
+            <a:off x="71760" y="5742682"/>
+            <a:ext cx="9937104" cy="369332"/>
+          </a:xfrm>
+          <a:prstGeom prst="rect">
+            <a:avLst/>
+          </a:prstGeom>
+          <a:noFill/>
+        </p:spPr>
+        <p:txBody>
+          <a:bodyPr wrap="square" rtlCol="0">
+            <a:spAutoFit/>
+          </a:bodyPr>
+          <a:lstStyle/>
+          <a:p>
+            <a:pPr algn="ctr"/>
+            <a:r>
+              <a:rPr lang="fr-CH" dirty="0" smtClean="0"/>
+              <a:t>Place à la démo !</a:t>
+            </a:r>
+            <a:endParaRPr lang="fr-CH" dirty="0"/>
+          </a:p>
+        </p:txBody>
+      </p:sp>
     </p:spTree>
   </p:cSld>
   <p:clrMapOvr>
@@ -6478,9 +6926,126 @@
   <p:timing>
     <p:tnLst>
       <p:par>
-        <p:cTn id="1" dur="indefinite" restart="never" nodeType="tmRoot"/>
+        <p:cTn id="1" dur="indefinite" restart="never" nodeType="tmRoot">
+          <p:childTnLst>
+            <p:seq concurrent="1" nextAc="seek">
+              <p:cTn id="2" dur="indefinite" nodeType="mainSeq">
+                <p:childTnLst>
+                  <p:par>
+                    <p:cTn id="3" fill="hold">
+                      <p:stCondLst>
+                        <p:cond delay="indefinite"/>
+                      </p:stCondLst>
+                      <p:childTnLst>
+                        <p:par>
+                          <p:cTn id="4" fill="hold">
+                            <p:stCondLst>
+                              <p:cond delay="0"/>
+                            </p:stCondLst>
+                            <p:childTnLst>
+                              <p:par>
+                                <p:cTn id="5" presetID="2" presetClass="entr" presetSubtype="4" fill="hold" grpId="0" nodeType="clickEffect">
+                                  <p:stCondLst>
+                                    <p:cond delay="0"/>
+                                  </p:stCondLst>
+                                  <p:childTnLst>
+                                    <p:set>
+                                      <p:cBhvr>
+                                        <p:cTn id="6" dur="1" fill="hold">
+                                          <p:stCondLst>
+                                            <p:cond delay="0"/>
+                                          </p:stCondLst>
+                                        </p:cTn>
+                                        <p:tgtEl>
+                                          <p:spTgt spid="7"/>
+                                        </p:tgtEl>
+                                        <p:attrNameLst>
+                                          <p:attrName>style.visibility</p:attrName>
+                                        </p:attrNameLst>
+                                      </p:cBhvr>
+                                      <p:to>
+                                        <p:strVal val="visible"/>
+                                      </p:to>
+                                    </p:set>
+                                    <p:anim calcmode="lin" valueType="num">
+                                      <p:cBhvr additive="base">
+                                        <p:cTn id="7" dur="500" fill="hold"/>
+                                        <p:tgtEl>
+                                          <p:spTgt spid="7"/>
+                                        </p:tgtEl>
+                                        <p:attrNameLst>
+                                          <p:attrName>ppt_x</p:attrName>
+                                        </p:attrNameLst>
+                                      </p:cBhvr>
+                                      <p:tavLst>
+                                        <p:tav tm="0">
+                                          <p:val>
+                                            <p:strVal val="#ppt_x"/>
+                                          </p:val>
+                                        </p:tav>
+                                        <p:tav tm="100000">
+                                          <p:val>
+                                            <p:strVal val="#ppt_x"/>
+                                          </p:val>
+                                        </p:tav>
+                                      </p:tavLst>
+                                    </p:anim>
+                                    <p:anim calcmode="lin" valueType="num">
+                                      <p:cBhvr additive="base">
+                                        <p:cTn id="8" dur="500" fill="hold"/>
+                                        <p:tgtEl>
+                                          <p:spTgt spid="7"/>
+                                        </p:tgtEl>
+                                        <p:attrNameLst>
+                                          <p:attrName>ppt_y</p:attrName>
+                                        </p:attrNameLst>
+                                      </p:cBhvr>
+                                      <p:tavLst>
+                                        <p:tav tm="0">
+                                          <p:val>
+                                            <p:strVal val="1+#ppt_h/2"/>
+                                          </p:val>
+                                        </p:tav>
+                                        <p:tav tm="100000">
+                                          <p:val>
+                                            <p:strVal val="#ppt_y"/>
+                                          </p:val>
+                                        </p:tav>
+                                      </p:tavLst>
+                                    </p:anim>
+                                  </p:childTnLst>
+                                </p:cTn>
+                              </p:par>
+                            </p:childTnLst>
+                          </p:cTn>
+                        </p:par>
+                      </p:childTnLst>
+                    </p:cTn>
+                  </p:par>
+                </p:childTnLst>
+              </p:cTn>
+              <p:prevCondLst>
+                <p:cond evt="onPrev" delay="0">
+                  <p:tgtEl>
+                    <p:sldTgt/>
+                  </p:tgtEl>
+                </p:cond>
+              </p:prevCondLst>
+              <p:nextCondLst>
+                <p:cond evt="onNext" delay="0">
+                  <p:tgtEl>
+                    <p:sldTgt/>
+                  </p:tgtEl>
+                </p:cond>
+              </p:nextCondLst>
+            </p:seq>
+          </p:childTnLst>
+        </p:cTn>
       </p:par>
     </p:tnLst>
+    <p:bldLst>
+      <p:bldP spid="7" grpId="0"/>
+    </p:bldLst>
   </p:timing>
 </p:sld>
 </file>
@@ -6649,7 +7214,7 @@
       </p:sp>
       <p:pic>
         <p:nvPicPr>
-          <p:cNvPr id="1026" name="Picture 2" descr="C:\Users\Miguel\Copy\Cours\2ème_année\PRO\Documentation\Présentation intermédiaire\schéma_simple.png"/>
+          <p:cNvPr id="1026" name="Picture 2"/>
           <p:cNvPicPr>
             <a:picLocks noChangeAspect="1" noChangeArrowheads="1"/>
           </p:cNvPicPr>
@@ -6663,15 +7228,14 @@
               </a:ext>
             </a:extLst>
           </a:blip>
-          <a:srcRect/>
           <a:stretch>
             <a:fillRect/>
           </a:stretch>
         </p:blipFill>
         <p:spPr bwMode="auto">
           <a:xfrm>
-            <a:off x="3113348" y="846138"/>
-            <a:ext cx="4303228" cy="6084764"/>
+            <a:off x="2232000" y="1278331"/>
+            <a:ext cx="5598435" cy="4896399"/>
           </a:xfrm>
           <a:prstGeom prst="rect">
             <a:avLst/>
@@ -6992,7 +7556,7 @@
         </p:nvSpPr>
         <p:spPr>
           <a:xfrm>
-            <a:off x="647998" y="2142448"/>
+            <a:off x="647998" y="2430480"/>
             <a:ext cx="9067684" cy="1367986"/>
           </a:xfrm>
         </p:spPr>
@@ -7000,16 +7564,17 @@
           <a:bodyPr/>
           <a:lstStyle/>
           <a:p>
-            <a:pPr lvl="0">
+            <a:pPr marL="685617" lvl="0" indent="-342900">
               <a:lnSpc>
                 <a:spcPct val="60000"/>
               </a:lnSpc>
               <a:buClr>
                 <a:srgbClr val="000000"/>
               </a:buClr>
-              <a:buSzPct val="45000"/>
-              <a:buFont typeface="StarSymbol"/>
-              <a:buChar char="●"/>
+              <a:buSzPct val="80000"/>
+              <a:buBlip>
+                <a:blip r:embed="rId3"/>
+              </a:buBlip>
             </a:pPr>
             <a:r>
               <a:rPr lang="fr-FR" sz="2000" dirty="0"/>
@@ -7017,16 +7582,17 @@
             </a:r>
           </a:p>
           <a:p>
-            <a:pPr lvl="0">
+            <a:pPr marL="685617" lvl="0" indent="-342900">
               <a:lnSpc>
                 <a:spcPct val="60000"/>
               </a:lnSpc>
               <a:buClr>
                 <a:srgbClr val="000000"/>
               </a:buClr>
-              <a:buSzPct val="45000"/>
-              <a:buFont typeface="StarSymbol"/>
-              <a:buChar char="●"/>
+              <a:buSzPct val="80000"/>
+              <a:buBlip>
+                <a:blip r:embed="rId3"/>
+              </a:buBlip>
             </a:pPr>
             <a:r>
               <a:rPr lang="fr-FR" sz="2000" dirty="0"/>
@@ -7039,46 +7605,43 @@
             <a:endParaRPr lang="fr-FR" sz="2000" dirty="0"/>
           </a:p>
           <a:p>
-            <a:pPr lvl="0">
+            <a:pPr marL="685617" lvl="0" indent="-342900">
               <a:lnSpc>
                 <a:spcPct val="60000"/>
               </a:lnSpc>
               <a:buClr>
                 <a:srgbClr val="000000"/>
               </a:buClr>
-              <a:buSzPct val="45000"/>
-              <a:buFont typeface="StarSymbol"/>
-              <a:buChar char="●"/>
+              <a:buSzPct val="80000"/>
+              <a:buBlip>
+                <a:blip r:embed="rId3"/>
+              </a:buBlip>
             </a:pPr>
             <a:r>
               <a:rPr lang="fr-FR" sz="2000" dirty="0" smtClean="0"/>
-              <a:t> </a:t>
+              <a:t> Temps</a:t>
             </a:r>
             <a:r>
               <a:rPr lang="fr-FR" sz="2000" dirty="0" smtClean="0"/>
-              <a:t>Temps.</a:t>
-            </a:r>
-            <a:endParaRPr lang="fr-FR" sz="2000" dirty="0"/>
-          </a:p>
-          <a:p>
-            <a:pPr lvl="0">
+              <a:t>.</a:t>
+            </a:r>
+          </a:p>
+          <a:p>
+            <a:pPr marL="685617" lvl="0" indent="-342900">
               <a:lnSpc>
                 <a:spcPct val="60000"/>
               </a:lnSpc>
               <a:buClr>
                 <a:srgbClr val="000000"/>
               </a:buClr>
-              <a:buSzPct val="45000"/>
-              <a:buFont typeface="StarSymbol"/>
-              <a:buChar char="●"/>
+              <a:buSzPct val="80000"/>
+              <a:buBlip>
+                <a:blip r:embed="rId3"/>
+              </a:buBlip>
             </a:pPr>
             <a:r>
-              <a:rPr lang="fr-FR" sz="2000" dirty="0"/>
-              <a:t> Suivi des conventions de codage</a:t>
-            </a:r>
-            <a:r>
               <a:rPr lang="fr-FR" sz="2000" dirty="0" smtClean="0"/>
-              <a:t>.</a:t>
+              <a:t> Sécurité implémentée à la fin =&gt; mauvaise idée.</a:t>
             </a:r>
             <a:endParaRPr lang="fr-FR" sz="2000" dirty="0"/>
           </a:p>
@@ -7096,7 +7659,7 @@
         </p:nvSpPr>
         <p:spPr>
           <a:xfrm>
-            <a:off x="647998" y="4230514"/>
+            <a:off x="647998" y="4446538"/>
             <a:ext cx="9067684" cy="1656184"/>
           </a:xfrm>
         </p:spPr>
@@ -7104,99 +7667,91 @@
           <a:bodyPr/>
           <a:lstStyle/>
           <a:p>
-            <a:pPr lvl="0">
+            <a:pPr marL="685617" lvl="0" indent="-342900">
               <a:lnSpc>
                 <a:spcPct val="60000"/>
               </a:lnSpc>
               <a:buClr>
                 <a:srgbClr val="000000"/>
               </a:buClr>
-              <a:buSzPct val="45000"/>
-              <a:buFont typeface="StarSymbol"/>
-              <a:buChar char="●"/>
+              <a:buSzPct val="80000"/>
+              <a:buBlip>
+                <a:blip r:embed="rId3"/>
+              </a:buBlip>
             </a:pPr>
             <a:r>
-              <a:rPr lang="fr-FR" sz="2000" dirty="0"/>
-              <a:t> Établissement de la communication entre le serveur et le client.</a:t>
-            </a:r>
-          </a:p>
-          <a:p>
-            <a:pPr lvl="0">
+              <a:rPr lang="fr-FR" sz="2000" dirty="0" smtClean="0"/>
+              <a:t> Installation de bibliothèques tierces sur Windows (</a:t>
+            </a:r>
+            <a:r>
+              <a:rPr lang="fr-FR" sz="2000" dirty="0" err="1" smtClean="0"/>
+              <a:t>OpenSSL</a:t>
+            </a:r>
+            <a:r>
+              <a:rPr lang="fr-FR" sz="2000" dirty="0" smtClean="0"/>
+              <a:t>).</a:t>
+            </a:r>
+          </a:p>
+          <a:p>
+            <a:pPr marL="685617" lvl="0" indent="-342900">
               <a:lnSpc>
                 <a:spcPct val="60000"/>
               </a:lnSpc>
               <a:buClr>
                 <a:srgbClr val="000000"/>
               </a:buClr>
-              <a:buSzPct val="45000"/>
-              <a:buFont typeface="StarSymbol"/>
-              <a:buChar char="●"/>
+              <a:buSzPct val="80000"/>
+              <a:buBlip>
+                <a:blip r:embed="rId3"/>
+              </a:buBlip>
             </a:pPr>
             <a:r>
               <a:rPr lang="fr-FR" sz="2000" dirty="0"/>
-              <a:t> Installation de bibliothèques tierces sur Windows (SSL</a:t>
+              <a:t> </a:t>
+            </a:r>
+            <a:r>
+              <a:rPr lang="fr-FR" sz="2000" dirty="0" err="1" smtClean="0"/>
+              <a:t>OpenSSL</a:t>
             </a:r>
             <a:r>
               <a:rPr lang="fr-FR" sz="2000" dirty="0" smtClean="0"/>
-              <a:t>).</a:t>
-            </a:r>
-          </a:p>
-          <a:p>
-            <a:pPr lvl="0">
+              <a:t> mal documenté.</a:t>
+            </a:r>
+            <a:endParaRPr lang="fr-FR" sz="2000" dirty="0" smtClean="0"/>
+          </a:p>
+          <a:p>
+            <a:pPr marL="685617" lvl="0" indent="-342900">
               <a:lnSpc>
                 <a:spcPct val="60000"/>
               </a:lnSpc>
               <a:buClr>
                 <a:srgbClr val="000000"/>
               </a:buClr>
-              <a:buSzPct val="45000"/>
-              <a:buFont typeface="StarSymbol"/>
-              <a:buChar char="●"/>
+              <a:buSzPct val="80000"/>
+              <a:buBlip>
+                <a:blip r:embed="rId3"/>
+              </a:buBlip>
             </a:pPr>
             <a:r>
-              <a:rPr lang="fr-FR" sz="2000" dirty="0"/>
-              <a:t> </a:t>
-            </a:r>
-            <a:r>
               <a:rPr lang="fr-FR" sz="2000" dirty="0" smtClean="0"/>
-              <a:t>Dépendances circulaires.</a:t>
-            </a:r>
-          </a:p>
-          <a:p>
-            <a:pPr lvl="0">
+              <a:t> Déverminage long et fastidieux.</a:t>
+            </a:r>
+          </a:p>
+          <a:p>
+            <a:pPr marL="685617" lvl="0" indent="-342900">
               <a:lnSpc>
                 <a:spcPct val="60000"/>
               </a:lnSpc>
               <a:buClr>
                 <a:srgbClr val="000000"/>
               </a:buClr>
-              <a:buSzPct val="45000"/>
-              <a:buFont typeface="StarSymbol"/>
-              <a:buChar char="●"/>
+              <a:buSzPct val="80000"/>
+              <a:buBlip>
+                <a:blip r:embed="rId3"/>
+              </a:buBlip>
             </a:pPr>
             <a:r>
-              <a:rPr lang="fr-FR" sz="2000" dirty="0"/>
-              <a:t> </a:t>
-            </a:r>
-            <a:r>
               <a:rPr lang="fr-FR" sz="2000" dirty="0" smtClean="0"/>
-              <a:t>Déverminage long et fastidieux.</a:t>
-            </a:r>
-          </a:p>
-          <a:p>
-            <a:pPr lvl="0">
-              <a:lnSpc>
-                <a:spcPct val="60000"/>
-              </a:lnSpc>
-              <a:buClr>
-                <a:srgbClr val="000000"/>
-              </a:buClr>
-              <a:buSzPct val="45000"/>
-              <a:buFont typeface="StarSymbol"/>
-              <a:buChar char="●"/>
-            </a:pPr>
-            <a:r>
-              <a:rPr lang="fr-FR" sz="2000" dirty="0"/>
               <a:t> </a:t>
             </a:r>
             <a:r>
@@ -7219,7 +7774,7 @@
         </p:nvSpPr>
         <p:spPr>
           <a:xfrm>
-            <a:off x="359999" y="1506154"/>
+            <a:off x="359999" y="1794186"/>
             <a:ext cx="5327998" cy="564120"/>
           </a:xfrm>
         </p:spPr>
@@ -7247,7 +7802,7 @@
         </p:nvSpPr>
         <p:spPr>
           <a:xfrm>
-            <a:off x="359999" y="3594386"/>
+            <a:off x="359999" y="3810410"/>
             <a:ext cx="5327998" cy="564120"/>
           </a:xfrm>
         </p:spPr>
@@ -7272,7 +7827,7 @@
           <p:nvPr/>
         </p:nvPicPr>
         <p:blipFill>
-          <a:blip r:embed="rId3">
+          <a:blip r:embed="rId4">
             <a:lum/>
             <a:alphaModFix/>
           </a:blip>
@@ -7304,7 +7859,7 @@
           <p:nvPr/>
         </p:nvPicPr>
         <p:blipFill>
-          <a:blip r:embed="rId4"/>
+          <a:blip r:embed="rId5"/>
           <a:srcRect/>
           <a:stretch>
             <a:fillRect/>
@@ -7618,7 +8173,7 @@
             </a:endParaRPr>
           </a:p>
           <a:p>
-            <a:pPr marL="342717" marR="0" lvl="0" indent="0" algn="l" defTabSz="914400" rtl="0" fontAlgn="auto" hangingPunct="0">
+            <a:pPr marL="799917" marR="0" lvl="0" indent="-457200" algn="l" defTabSz="914400" rtl="0" fontAlgn="auto" hangingPunct="0">
               <a:lnSpc>
                 <a:spcPct val="93000"/>
               </a:lnSpc>
@@ -7631,9 +8186,10 @@
               <a:buClr>
                 <a:srgbClr val="000000"/>
               </a:buClr>
-              <a:buSzPct val="45000"/>
-              <a:buFont typeface="StarSymbol"/>
-              <a:buChar char="●"/>
+              <a:buSzPct val="80000"/>
+              <a:buBlip>
+                <a:blip r:embed="rId3"/>
+              </a:buBlip>
               <a:tabLst>
                 <a:tab pos="342717" algn="l"/>
                 <a:tab pos="448915" algn="l"/>
@@ -7678,7 +8234,7 @@
             </a:r>
           </a:p>
           <a:p>
-            <a:pPr marL="342717" marR="0" lvl="0" indent="0" algn="l" defTabSz="914400" rtl="0" fontAlgn="auto" hangingPunct="0">
+            <a:pPr marL="799917" marR="0" lvl="0" indent="-457200" algn="l" defTabSz="914400" rtl="0" fontAlgn="auto" hangingPunct="0">
               <a:lnSpc>
                 <a:spcPct val="93000"/>
               </a:lnSpc>
@@ -7691,9 +8247,10 @@
               <a:buClr>
                 <a:srgbClr val="000000"/>
               </a:buClr>
-              <a:buSzPct val="45000"/>
-              <a:buFont typeface="StarSymbol"/>
-              <a:buChar char="●"/>
+              <a:buSzPct val="80000"/>
+              <a:buBlip>
+                <a:blip r:embed="rId3"/>
+              </a:buBlip>
               <a:tabLst>
                 <a:tab pos="342717" algn="l"/>
                 <a:tab pos="448915" algn="l"/>
@@ -7759,7 +8316,7 @@
             </a:endParaRPr>
           </a:p>
           <a:p>
-            <a:pPr marL="342717" marR="0" lvl="0" indent="0" algn="l" defTabSz="914400" rtl="0" fontAlgn="auto" hangingPunct="0">
+            <a:pPr marL="799917" marR="0" lvl="0" indent="-457200" algn="l" defTabSz="914400" rtl="0" fontAlgn="auto" hangingPunct="0">
               <a:lnSpc>
                 <a:spcPct val="93000"/>
               </a:lnSpc>
@@ -7772,9 +8329,10 @@
               <a:buClr>
                 <a:srgbClr val="000000"/>
               </a:buClr>
-              <a:buSzPct val="45000"/>
-              <a:buFont typeface="StarSymbol"/>
-              <a:buChar char="●"/>
+              <a:buSzPct val="80000"/>
+              <a:buBlip>
+                <a:blip r:embed="rId3"/>
+              </a:buBlip>
               <a:tabLst>
                 <a:tab pos="342717" algn="l"/>
                 <a:tab pos="448915" algn="l"/>
@@ -7867,7 +8425,7 @@
             </a:r>
           </a:p>
           <a:p>
-            <a:pPr marL="342717" marR="0" lvl="0" indent="0" algn="l" defTabSz="914400" rtl="0" fontAlgn="auto" hangingPunct="0">
+            <a:pPr marL="799917" marR="0" lvl="0" indent="-457200" algn="l" defTabSz="914400" rtl="0" fontAlgn="auto" hangingPunct="0">
               <a:lnSpc>
                 <a:spcPct val="93000"/>
               </a:lnSpc>
@@ -7880,9 +8438,10 @@
               <a:buClr>
                 <a:srgbClr val="000000"/>
               </a:buClr>
-              <a:buSzPct val="45000"/>
-              <a:buFont typeface="StarSymbol"/>
-              <a:buChar char="●"/>
+              <a:buSzPct val="80000"/>
+              <a:buBlip>
+                <a:blip r:embed="rId3"/>
+              </a:buBlip>
               <a:tabLst>
                 <a:tab pos="342717" algn="l"/>
                 <a:tab pos="448915" algn="l"/>
@@ -7937,7 +8496,7 @@
           <p:nvPr/>
         </p:nvPicPr>
         <p:blipFill>
-          <a:blip r:embed="rId3"/>
+          <a:blip r:embed="rId4"/>
           <a:srcRect/>
           <a:stretch>
             <a:fillRect/>
@@ -8492,13 +9051,14 @@
             </a:lvl5pPr>
           </a:lstStyle>
           <a:p>
-            <a:pPr>
+            <a:pPr marL="685617" indent="-342900">
               <a:buClr>
                 <a:srgbClr val="000000"/>
               </a:buClr>
-              <a:buSzPct val="45000"/>
-              <a:buFont typeface="StarSymbol"/>
-              <a:buChar char="●"/>
+              <a:buSzPct val="80000"/>
+              <a:buBlip>
+                <a:blip r:embed="rId4"/>
+              </a:buBlip>
             </a:pPr>
             <a:r>
               <a:rPr lang="fr-CH" sz="2000" dirty="0" smtClean="0"/>
@@ -8514,13 +9074,14 @@
             </a:r>
           </a:p>
           <a:p>
-            <a:pPr>
+            <a:pPr marL="685617" indent="-342900">
               <a:buClr>
                 <a:srgbClr val="000000"/>
               </a:buClr>
-              <a:buSzPct val="45000"/>
-              <a:buFont typeface="StarSymbol"/>
-              <a:buChar char="●"/>
+              <a:buSzPct val="80000"/>
+              <a:buBlip>
+                <a:blip r:embed="rId4"/>
+              </a:buBlip>
             </a:pPr>
             <a:r>
               <a:rPr lang="fr-CH" sz="2000" dirty="0" smtClean="0"/>
@@ -8528,13 +9089,14 @@
             </a:r>
           </a:p>
           <a:p>
-            <a:pPr>
+            <a:pPr marL="685617" indent="-342900">
               <a:buClr>
                 <a:srgbClr val="000000"/>
               </a:buClr>
-              <a:buSzPct val="45000"/>
-              <a:buFont typeface="StarSymbol"/>
-              <a:buChar char="●"/>
+              <a:buSzPct val="80000"/>
+              <a:buBlip>
+                <a:blip r:embed="rId4"/>
+              </a:buBlip>
             </a:pPr>
             <a:r>
               <a:rPr lang="fr-CH" sz="2000" dirty="0" smtClean="0"/>
@@ -8542,13 +9104,14 @@
             </a:r>
           </a:p>
           <a:p>
-            <a:pPr>
+            <a:pPr marL="685617" indent="-342900">
               <a:buClr>
                 <a:srgbClr val="000000"/>
               </a:buClr>
-              <a:buSzPct val="45000"/>
-              <a:buFont typeface="StarSymbol"/>
-              <a:buChar char="●"/>
+              <a:buSzPct val="80000"/>
+              <a:buBlip>
+                <a:blip r:embed="rId4"/>
+              </a:buBlip>
             </a:pPr>
             <a:r>
               <a:rPr lang="fr-CH" sz="2000" dirty="0" smtClean="0"/>
@@ -8824,13 +9387,14 @@
             </a:lvl5pPr>
           </a:lstStyle>
           <a:p>
-            <a:pPr>
+            <a:pPr marL="685617" indent="-342900">
               <a:buClr>
                 <a:srgbClr val="000000"/>
               </a:buClr>
-              <a:buSzPct val="45000"/>
-              <a:buFont typeface="StarSymbol"/>
-              <a:buChar char="●"/>
+              <a:buSzPct val="80000"/>
+              <a:buBlip>
+                <a:blip r:embed="rId4"/>
+              </a:buBlip>
             </a:pPr>
             <a:r>
               <a:rPr lang="fr-CH" sz="2000" dirty="0" smtClean="0"/>
@@ -8838,13 +9402,14 @@
             </a:r>
           </a:p>
           <a:p>
-            <a:pPr>
+            <a:pPr marL="685617" indent="-342900">
               <a:buClr>
                 <a:srgbClr val="000000"/>
               </a:buClr>
-              <a:buSzPct val="45000"/>
-              <a:buFont typeface="StarSymbol"/>
-              <a:buChar char="●"/>
+              <a:buSzPct val="80000"/>
+              <a:buBlip>
+                <a:blip r:embed="rId4"/>
+              </a:buBlip>
             </a:pPr>
             <a:r>
               <a:rPr lang="fr-CH" sz="2000" dirty="0"/>
@@ -8856,13 +9421,14 @@
             </a:r>
           </a:p>
           <a:p>
-            <a:pPr>
+            <a:pPr marL="685617" indent="-342900">
               <a:buClr>
                 <a:srgbClr val="000000"/>
               </a:buClr>
-              <a:buSzPct val="45000"/>
-              <a:buFont typeface="StarSymbol"/>
-              <a:buChar char="●"/>
+              <a:buSzPct val="80000"/>
+              <a:buBlip>
+                <a:blip r:embed="rId4"/>
+              </a:buBlip>
             </a:pPr>
             <a:r>
               <a:rPr lang="fr-CH" sz="2000" dirty="0"/>
@@ -9183,24 +9749,25 @@
         </p:nvSpPr>
         <p:spPr>
           <a:xfrm>
-            <a:off x="503276" y="1515502"/>
-            <a:ext cx="9217554" cy="4659228"/>
+            <a:off x="503276" y="2430314"/>
+            <a:ext cx="9217554" cy="1994932"/>
           </a:xfrm>
         </p:spPr>
         <p:txBody>
           <a:bodyPr/>
           <a:lstStyle/>
           <a:p>
-            <a:pPr lvl="0">
+            <a:pPr marL="799917" lvl="0" indent="-457200">
               <a:lnSpc>
                 <a:spcPct val="80000"/>
               </a:lnSpc>
               <a:buClr>
                 <a:srgbClr val="000000"/>
               </a:buClr>
-              <a:buSzPct val="45000"/>
-              <a:buFont typeface="StarSymbol"/>
-              <a:buChar char="●"/>
+              <a:buSzPct val="80000"/>
+              <a:buBlip>
+                <a:blip r:embed="rId3"/>
+              </a:buBlip>
             </a:pPr>
             <a:r>
               <a:rPr lang="fr-FR" dirty="0" smtClean="0"/>
@@ -9208,16 +9775,17 @@
             </a:r>
           </a:p>
           <a:p>
-            <a:pPr lvl="0">
+            <a:pPr marL="799917" lvl="0" indent="-457200">
               <a:lnSpc>
                 <a:spcPct val="80000"/>
               </a:lnSpc>
               <a:buClr>
                 <a:srgbClr val="000000"/>
               </a:buClr>
-              <a:buSzPct val="45000"/>
-              <a:buFont typeface="StarSymbol"/>
-              <a:buChar char="●"/>
+              <a:buSzPct val="80000"/>
+              <a:buBlip>
+                <a:blip r:embed="rId3"/>
+              </a:buBlip>
             </a:pPr>
             <a:r>
               <a:rPr lang="fr-FR" dirty="0"/>
@@ -9229,16 +9797,17 @@
             </a:r>
           </a:p>
           <a:p>
-            <a:pPr lvl="0">
+            <a:pPr marL="799917" lvl="0" indent="-457200">
               <a:lnSpc>
                 <a:spcPct val="80000"/>
               </a:lnSpc>
               <a:buClr>
                 <a:srgbClr val="000000"/>
               </a:buClr>
-              <a:buSzPct val="45000"/>
-              <a:buFont typeface="StarSymbol"/>
-              <a:buChar char="●"/>
+              <a:buSzPct val="80000"/>
+              <a:buBlip>
+                <a:blip r:embed="rId3"/>
+              </a:buBlip>
             </a:pPr>
             <a:r>
               <a:rPr lang="fr-FR" dirty="0"/>
@@ -9250,13 +9819,14 @@
             </a:r>
           </a:p>
           <a:p>
-            <a:pPr lvl="0">
+            <a:pPr marL="799917" lvl="0" indent="-457200">
               <a:buClr>
                 <a:srgbClr val="000000"/>
               </a:buClr>
-              <a:buSzPct val="45000"/>
-              <a:buFont typeface="StarSymbol"/>
-              <a:buChar char="●"/>
+              <a:buSzPct val="80000"/>
+              <a:buBlip>
+                <a:blip r:embed="rId3"/>
+              </a:buBlip>
             </a:pPr>
             <a:r>
               <a:rPr lang="fr-FR" dirty="0"/>
@@ -9264,139 +9834,13 @@
             </a:r>
             <a:r>
               <a:rPr lang="fr-FR" dirty="0" smtClean="0"/>
-              <a:t>Apport d’une expérience solide.</a:t>
-            </a:r>
-          </a:p>
-          <a:p>
-            <a:pPr lvl="0">
-              <a:buClr>
-                <a:srgbClr val="000000"/>
-              </a:buClr>
-              <a:buSzPct val="45000"/>
-            </a:pPr>
-            <a:endParaRPr lang="fr-FR" sz="1500" dirty="0"/>
-          </a:p>
-          <a:p>
-            <a:pPr lvl="0">
-              <a:buClr>
-                <a:srgbClr val="000000"/>
-              </a:buClr>
-              <a:buSzPct val="45000"/>
-            </a:pPr>
-            <a:r>
-              <a:rPr lang="fr-FR" sz="1800" dirty="0" smtClean="0"/>
-              <a:t>Quelques chiffres…</a:t>
-            </a:r>
-          </a:p>
-          <a:p>
-            <a:pPr marL="685617" lvl="0" indent="-342900">
-              <a:lnSpc>
-                <a:spcPct val="50000"/>
-              </a:lnSpc>
-              <a:buClr>
-                <a:srgbClr val="000000"/>
-              </a:buClr>
-              <a:buSzPct val="45000"/>
-              <a:buFont typeface="Arial" panose="020B0604020202020204" pitchFamily="34" charset="0"/>
-              <a:buChar char="•"/>
-            </a:pPr>
-            <a:r>
-              <a:rPr lang="fr-FR" sz="1800" dirty="0" smtClean="0"/>
-              <a:t> 14 semaines de travail.</a:t>
-            </a:r>
-          </a:p>
-          <a:p>
-            <a:pPr marL="685617" lvl="0" indent="-342900">
-              <a:lnSpc>
-                <a:spcPct val="50000"/>
-              </a:lnSpc>
-              <a:buClr>
-                <a:srgbClr val="000000"/>
-              </a:buClr>
-              <a:buSzPct val="45000"/>
-              <a:buFont typeface="Arial" panose="020B0604020202020204" pitchFamily="34" charset="0"/>
-              <a:buChar char="•"/>
-            </a:pPr>
-            <a:r>
-              <a:rPr lang="fr-FR" sz="1800" dirty="0" smtClean="0"/>
-              <a:t> 501 heures totales de travail.</a:t>
-            </a:r>
-          </a:p>
-          <a:p>
-            <a:pPr marL="685617" lvl="0" indent="-342900">
-              <a:lnSpc>
-                <a:spcPct val="50000"/>
-              </a:lnSpc>
-              <a:buClr>
-                <a:srgbClr val="000000"/>
-              </a:buClr>
-              <a:buSzPct val="45000"/>
-              <a:buFont typeface="Arial" panose="020B0604020202020204" pitchFamily="34" charset="0"/>
-              <a:buChar char="•"/>
-            </a:pPr>
-            <a:r>
-              <a:rPr lang="fr-FR" sz="1800" dirty="0" smtClean="0"/>
-              <a:t> 3’662 fichiers échangés.</a:t>
-            </a:r>
-          </a:p>
-          <a:p>
-            <a:pPr marL="685617" lvl="0" indent="-342900">
-              <a:lnSpc>
-                <a:spcPct val="50000"/>
-              </a:lnSpc>
-              <a:buClr>
-                <a:srgbClr val="000000"/>
-              </a:buClr>
-              <a:buSzPct val="45000"/>
-              <a:buFont typeface="Arial" panose="020B0604020202020204" pitchFamily="34" charset="0"/>
-              <a:buChar char="•"/>
-            </a:pPr>
-            <a:r>
-              <a:rPr lang="fr-FR" sz="1800" dirty="0" smtClean="0"/>
-              <a:t> 6’051 lignes de code.</a:t>
-            </a:r>
-          </a:p>
-          <a:p>
-            <a:pPr marL="685617" lvl="0" indent="-342900">
-              <a:lnSpc>
-                <a:spcPct val="50000"/>
-              </a:lnSpc>
-              <a:buClr>
-                <a:srgbClr val="000000"/>
-              </a:buClr>
-              <a:buSzPct val="45000"/>
-              <a:buFont typeface="Arial" panose="020B0604020202020204" pitchFamily="34" charset="0"/>
-              <a:buChar char="•"/>
-            </a:pPr>
-            <a:r>
-              <a:rPr lang="fr-FR" sz="1800" dirty="0" smtClean="0"/>
-              <a:t> 110 pages de documentation.</a:t>
-            </a:r>
-          </a:p>
-          <a:p>
-            <a:pPr marL="685617" lvl="0" indent="-342900">
-              <a:lnSpc>
-                <a:spcPct val="50000"/>
-              </a:lnSpc>
-              <a:buClr>
-                <a:srgbClr val="000000"/>
-              </a:buClr>
-              <a:buSzPct val="45000"/>
-              <a:buFont typeface="Arial" panose="020B0604020202020204" pitchFamily="34" charset="0"/>
-              <a:buChar char="•"/>
-            </a:pPr>
-            <a:r>
-              <a:rPr lang="fr-FR" sz="1800" dirty="0"/>
-              <a:t> </a:t>
-            </a:r>
-            <a:r>
-              <a:rPr lang="fr-FR" sz="1800" strike="sngStrike" dirty="0" smtClean="0"/>
-              <a:t>15</a:t>
-            </a:r>
-            <a:r>
-              <a:rPr lang="fr-FR" sz="1800" dirty="0" smtClean="0"/>
-              <a:t> 2 apéros.</a:t>
-            </a:r>
+              <a:t>Apport d’une expérience solide</a:t>
+            </a:r>
+            <a:r>
+              <a:rPr lang="fr-FR" dirty="0" smtClean="0"/>
+              <a:t>.</a:t>
+            </a:r>
+            <a:endParaRPr lang="fr-FR" dirty="0" smtClean="0"/>
           </a:p>
         </p:txBody>
       </p:sp>
@@ -9409,7 +9853,7 @@
           <p:nvPr/>
         </p:nvPicPr>
         <p:blipFill>
-          <a:blip r:embed="rId3">
+          <a:blip r:embed="rId4">
             <a:lum/>
             <a:alphaModFix/>
           </a:blip>
@@ -9441,7 +9885,7 @@
           <p:nvPr/>
         </p:nvPicPr>
         <p:blipFill>
-          <a:blip r:embed="rId3">
+          <a:blip r:embed="rId4">
             <a:lum/>
             <a:alphaModFix/>
           </a:blip>
@@ -9528,62 +9972,6 @@
           </a:p>
         </p:txBody>
       </p:sp>
-      <p:pic>
-        <p:nvPicPr>
-          <p:cNvPr id="1026" name="Picture 2"/>
-          <p:cNvPicPr>
-            <a:picLocks noChangeAspect="1" noChangeArrowheads="1"/>
-          </p:cNvPicPr>
-          <p:nvPr/>
-        </p:nvPicPr>
-        <p:blipFill>
-          <a:blip r:embed="rId4" cstate="print">
-            <a:extLst>
-              <a:ext uri="{28A0092B-C50C-407E-A947-70E740481C1C}">
-                <a14:useLocalDpi xmlns:a14="http://schemas.microsoft.com/office/drawing/2010/main" val="0"/>
-              </a:ext>
-            </a:extLst>
-          </a:blip>
-          <a:srcRect/>
-          <a:stretch>
-            <a:fillRect/>
-          </a:stretch>
-        </p:blipFill>
-        <p:spPr bwMode="auto">
-          <a:xfrm>
-            <a:off x="4608264" y="3652506"/>
-            <a:ext cx="4320610" cy="2594232"/>
-          </a:xfrm>
-          <a:prstGeom prst="rect">
-            <a:avLst/>
-          </a:prstGeom>
-          <a:ln>
-            <a:noFill/>
-          </a:ln>
-          <a:effectLst>
-            <a:softEdge rad="112500"/>
-          </a:effectLst>
-          <a:extLst>
-            <a:ext uri="{909E8E84-426E-40DD-AFC4-6F175D3DCCD1}">
-              <a14:hiddenFill xmlns:a14="http://schemas.microsoft.com/office/drawing/2010/main">
-                <a:solidFill>
-                  <a:schemeClr val="accent1"/>
-                </a:solidFill>
-              </a14:hiddenFill>
-            </a:ext>
-            <a:ext uri="{91240B29-F687-4F45-9708-019B960494DF}">
-              <a14:hiddenLine xmlns:a14="http://schemas.microsoft.com/office/drawing/2010/main" w="9525">
-                <a:solidFill>
-                  <a:schemeClr val="tx1"/>
-                </a:solidFill>
-                <a:miter lim="800000"/>
-                <a:headEnd/>
-                <a:tailEnd/>
-              </a14:hiddenLine>
-            </a:ext>
-          </a:extLst>
-        </p:spPr>
-      </p:pic>
     </p:spTree>
   </p:cSld>
   <p:clrMapOvr>

</xml_diff>